<commit_message>
AWS code + PPT
</commit_message>
<xml_diff>
--- a/gioia/screencast/screencast.pptx
+++ b/gioia/screencast/screencast.pptx
@@ -4,6 +4,9 @@
   <p:sldMasterIdLst>
     <p:sldMasterId id="2147483648" r:id="rId1"/>
   </p:sldMasterIdLst>
+  <p:notesMasterIdLst>
+    <p:notesMasterId r:id="rId60"/>
+  </p:notesMasterIdLst>
   <p:sldIdLst>
     <p:sldId id="256" r:id="rId2"/>
     <p:sldId id="257" r:id="rId3"/>
@@ -62,6 +65,7 @@
     <p:sldId id="307" r:id="rId56"/>
     <p:sldId id="308" r:id="rId57"/>
     <p:sldId id="309" r:id="rId58"/>
+    <p:sldId id="323" r:id="rId59"/>
   </p:sldIdLst>
   <p:sldSz cx="9144000" cy="6858000" type="screen4x3"/>
   <p:notesSz cx="6858000" cy="9144000"/>
@@ -161,6 +165,954 @@
     </a:lvl9pPr>
   </p:defaultTextStyle>
 </p:presentation>
+</file>
+
+<file path=ppt/charts/chart1.xml><?xml version="1.0" encoding="utf-8"?>
+<c:chartSpace xmlns:c="http://schemas.openxmlformats.org/drawingml/2006/chart" xmlns:a="http://schemas.openxmlformats.org/drawingml/2006/main" xmlns:r="http://schemas.openxmlformats.org/officeDocument/2006/relationships">
+  <c:date1904 val="0"/>
+  <c:lang val="en-US"/>
+  <c:roundedCorners val="0"/>
+  <mc:AlternateContent xmlns:mc="http://schemas.openxmlformats.org/markup-compatibility/2006">
+    <mc:Choice xmlns:c14="http://schemas.microsoft.com/office/drawing/2007/8/2/chart" Requires="c14">
+      <c14:style val="118"/>
+    </mc:Choice>
+    <mc:Fallback>
+      <c:style val="18"/>
+    </mc:Fallback>
+  </mc:AlternateContent>
+  <c:chart>
+    <c:autoTitleDeleted val="0"/>
+    <c:plotArea>
+      <c:layout/>
+      <c:lineChart>
+        <c:grouping val="standard"/>
+        <c:varyColors val="0"/>
+        <c:ser>
+          <c:idx val="0"/>
+          <c:order val="0"/>
+          <c:tx>
+            <c:strRef>
+              <c:f>Sheet1!$B$1</c:f>
+              <c:strCache>
+                <c:ptCount val="1"/>
+                <c:pt idx="0">
+                  <c:v>Serial</c:v>
+                </c:pt>
+              </c:strCache>
+            </c:strRef>
+          </c:tx>
+          <c:spPr>
+            <a:ln>
+              <a:solidFill>
+                <a:schemeClr val="bg1">
+                  <a:lumMod val="50000"/>
+                </a:schemeClr>
+              </a:solidFill>
+              <a:prstDash val="sysDash"/>
+            </a:ln>
+          </c:spPr>
+          <c:marker>
+            <c:symbol val="none"/>
+          </c:marker>
+          <c:cat>
+            <c:strRef>
+              <c:f>Sheet1!$A$2:$A$7</c:f>
+              <c:strCache>
+                <c:ptCount val="6"/>
+                <c:pt idx="0">
+                  <c:v>1_x000d_200</c:v>
+                </c:pt>
+                <c:pt idx="1">
+                  <c:v>10_x000d_1,500</c:v>
+                </c:pt>
+                <c:pt idx="2">
+                  <c:v>100_x000d_12,000</c:v>
+                </c:pt>
+                <c:pt idx="3">
+                  <c:v>250_x000d_32,500</c:v>
+                </c:pt>
+                <c:pt idx="4">
+                  <c:v>500_x000d_66,500</c:v>
+                </c:pt>
+                <c:pt idx="5">
+                  <c:v>1000_x000d_131,000</c:v>
+                </c:pt>
+              </c:strCache>
+            </c:strRef>
+          </c:cat>
+          <c:val>
+            <c:numRef>
+              <c:f>Sheet1!$B$2:$B$7</c:f>
+              <c:numCache>
+                <c:formatCode>General</c:formatCode>
+                <c:ptCount val="6"/>
+                <c:pt idx="0">
+                  <c:v>42.66</c:v>
+                </c:pt>
+                <c:pt idx="1">
+                  <c:v>42.78</c:v>
+                </c:pt>
+                <c:pt idx="2">
+                  <c:v>40.65</c:v>
+                </c:pt>
+              </c:numCache>
+            </c:numRef>
+          </c:val>
+          <c:smooth val="0"/>
+        </c:ser>
+        <c:ser>
+          <c:idx val="1"/>
+          <c:order val="1"/>
+          <c:tx>
+            <c:strRef>
+              <c:f>Sheet1!$C$1</c:f>
+              <c:strCache>
+                <c:ptCount val="1"/>
+                <c:pt idx="0">
+                  <c:v>Naïve SPARK - local</c:v>
+                </c:pt>
+              </c:strCache>
+            </c:strRef>
+          </c:tx>
+          <c:spPr>
+            <a:ln>
+              <a:solidFill>
+                <a:schemeClr val="tx2"/>
+              </a:solidFill>
+            </a:ln>
+          </c:spPr>
+          <c:marker>
+            <c:symbol val="none"/>
+          </c:marker>
+          <c:cat>
+            <c:strRef>
+              <c:f>Sheet1!$A$2:$A$7</c:f>
+              <c:strCache>
+                <c:ptCount val="6"/>
+                <c:pt idx="0">
+                  <c:v>1_x000d_200</c:v>
+                </c:pt>
+                <c:pt idx="1">
+                  <c:v>10_x000d_1,500</c:v>
+                </c:pt>
+                <c:pt idx="2">
+                  <c:v>100_x000d_12,000</c:v>
+                </c:pt>
+                <c:pt idx="3">
+                  <c:v>250_x000d_32,500</c:v>
+                </c:pt>
+                <c:pt idx="4">
+                  <c:v>500_x000d_66,500</c:v>
+                </c:pt>
+                <c:pt idx="5">
+                  <c:v>1000_x000d_131,000</c:v>
+                </c:pt>
+              </c:strCache>
+            </c:strRef>
+          </c:cat>
+          <c:val>
+            <c:numRef>
+              <c:f>Sheet1!$C$2:$C$7</c:f>
+              <c:numCache>
+                <c:formatCode>General</c:formatCode>
+                <c:ptCount val="6"/>
+                <c:pt idx="0">
+                  <c:v>4.0</c:v>
+                </c:pt>
+                <c:pt idx="1">
+                  <c:v>24.0</c:v>
+                </c:pt>
+                <c:pt idx="2">
+                  <c:v>61.0</c:v>
+                </c:pt>
+                <c:pt idx="3">
+                  <c:v>67.0</c:v>
+                </c:pt>
+                <c:pt idx="4">
+                  <c:v>70.0</c:v>
+                </c:pt>
+              </c:numCache>
+            </c:numRef>
+          </c:val>
+          <c:smooth val="0"/>
+        </c:ser>
+        <c:ser>
+          <c:idx val="2"/>
+          <c:order val="2"/>
+          <c:tx>
+            <c:strRef>
+              <c:f>Sheet1!$D$1</c:f>
+              <c:strCache>
+                <c:ptCount val="1"/>
+                <c:pt idx="0">
+                  <c:v>Naïve SPARK - AWS</c:v>
+                </c:pt>
+              </c:strCache>
+            </c:strRef>
+          </c:tx>
+          <c:spPr>
+            <a:ln>
+              <a:solidFill>
+                <a:schemeClr val="tx2"/>
+              </a:solidFill>
+              <a:prstDash val="sysDash"/>
+            </a:ln>
+          </c:spPr>
+          <c:marker>
+            <c:symbol val="none"/>
+          </c:marker>
+          <c:cat>
+            <c:strRef>
+              <c:f>Sheet1!$A$2:$A$7</c:f>
+              <c:strCache>
+                <c:ptCount val="6"/>
+                <c:pt idx="0">
+                  <c:v>1_x000d_200</c:v>
+                </c:pt>
+                <c:pt idx="1">
+                  <c:v>10_x000d_1,500</c:v>
+                </c:pt>
+                <c:pt idx="2">
+                  <c:v>100_x000d_12,000</c:v>
+                </c:pt>
+                <c:pt idx="3">
+                  <c:v>250_x000d_32,500</c:v>
+                </c:pt>
+                <c:pt idx="4">
+                  <c:v>500_x000d_66,500</c:v>
+                </c:pt>
+                <c:pt idx="5">
+                  <c:v>1000_x000d_131,000</c:v>
+                </c:pt>
+              </c:strCache>
+            </c:strRef>
+          </c:cat>
+          <c:val>
+            <c:numRef>
+              <c:f>Sheet1!$D$2:$D$7</c:f>
+              <c:numCache>
+                <c:formatCode>General</c:formatCode>
+                <c:ptCount val="6"/>
+                <c:pt idx="0">
+                  <c:v>9.0</c:v>
+                </c:pt>
+                <c:pt idx="1">
+                  <c:v>53.0</c:v>
+                </c:pt>
+                <c:pt idx="2">
+                  <c:v>171.0</c:v>
+                </c:pt>
+                <c:pt idx="3">
+                  <c:v>228.0</c:v>
+                </c:pt>
+                <c:pt idx="4">
+                  <c:v>257.0</c:v>
+                </c:pt>
+                <c:pt idx="5">
+                  <c:v>276.0</c:v>
+                </c:pt>
+              </c:numCache>
+            </c:numRef>
+          </c:val>
+          <c:smooth val="0"/>
+        </c:ser>
+        <c:ser>
+          <c:idx val="3"/>
+          <c:order val="3"/>
+          <c:tx>
+            <c:strRef>
+              <c:f>Sheet1!$E$1</c:f>
+              <c:strCache>
+                <c:ptCount val="1"/>
+                <c:pt idx="0">
+                  <c:v>Full SPARK - local</c:v>
+                </c:pt>
+              </c:strCache>
+            </c:strRef>
+          </c:tx>
+          <c:spPr>
+            <a:ln>
+              <a:solidFill>
+                <a:srgbClr val="31859C"/>
+              </a:solidFill>
+            </a:ln>
+          </c:spPr>
+          <c:marker>
+            <c:symbol val="none"/>
+          </c:marker>
+          <c:cat>
+            <c:strRef>
+              <c:f>Sheet1!$A$2:$A$7</c:f>
+              <c:strCache>
+                <c:ptCount val="6"/>
+                <c:pt idx="0">
+                  <c:v>1_x000d_200</c:v>
+                </c:pt>
+                <c:pt idx="1">
+                  <c:v>10_x000d_1,500</c:v>
+                </c:pt>
+                <c:pt idx="2">
+                  <c:v>100_x000d_12,000</c:v>
+                </c:pt>
+                <c:pt idx="3">
+                  <c:v>250_x000d_32,500</c:v>
+                </c:pt>
+                <c:pt idx="4">
+                  <c:v>500_x000d_66,500</c:v>
+                </c:pt>
+                <c:pt idx="5">
+                  <c:v>1000_x000d_131,000</c:v>
+                </c:pt>
+              </c:strCache>
+            </c:strRef>
+          </c:cat>
+          <c:val>
+            <c:numRef>
+              <c:f>Sheet1!$E$2:$E$7</c:f>
+              <c:numCache>
+                <c:formatCode>General</c:formatCode>
+                <c:ptCount val="6"/>
+                <c:pt idx="0">
+                  <c:v>2.0</c:v>
+                </c:pt>
+                <c:pt idx="1">
+                  <c:v>11.0</c:v>
+                </c:pt>
+                <c:pt idx="2">
+                  <c:v>33.0</c:v>
+                </c:pt>
+                <c:pt idx="3">
+                  <c:v>41.0</c:v>
+                </c:pt>
+                <c:pt idx="4">
+                  <c:v>46.0</c:v>
+                </c:pt>
+              </c:numCache>
+            </c:numRef>
+          </c:val>
+          <c:smooth val="0"/>
+        </c:ser>
+        <c:ser>
+          <c:idx val="4"/>
+          <c:order val="4"/>
+          <c:tx>
+            <c:strRef>
+              <c:f>Sheet1!$F$1</c:f>
+              <c:strCache>
+                <c:ptCount val="1"/>
+                <c:pt idx="0">
+                  <c:v>Full SPARK - AWS</c:v>
+                </c:pt>
+              </c:strCache>
+            </c:strRef>
+          </c:tx>
+          <c:spPr>
+            <a:ln>
+              <a:solidFill>
+                <a:schemeClr val="accent5">
+                  <a:lumMod val="75000"/>
+                </a:schemeClr>
+              </a:solidFill>
+              <a:prstDash val="sysDash"/>
+            </a:ln>
+          </c:spPr>
+          <c:marker>
+            <c:symbol val="none"/>
+          </c:marker>
+          <c:cat>
+            <c:strRef>
+              <c:f>Sheet1!$A$2:$A$7</c:f>
+              <c:strCache>
+                <c:ptCount val="6"/>
+                <c:pt idx="0">
+                  <c:v>1_x000d_200</c:v>
+                </c:pt>
+                <c:pt idx="1">
+                  <c:v>10_x000d_1,500</c:v>
+                </c:pt>
+                <c:pt idx="2">
+                  <c:v>100_x000d_12,000</c:v>
+                </c:pt>
+                <c:pt idx="3">
+                  <c:v>250_x000d_32,500</c:v>
+                </c:pt>
+                <c:pt idx="4">
+                  <c:v>500_x000d_66,500</c:v>
+                </c:pt>
+                <c:pt idx="5">
+                  <c:v>1000_x000d_131,000</c:v>
+                </c:pt>
+              </c:strCache>
+            </c:strRef>
+          </c:cat>
+          <c:val>
+            <c:numRef>
+              <c:f>Sheet1!$F$2:$F$7</c:f>
+              <c:numCache>
+                <c:formatCode>General</c:formatCode>
+                <c:ptCount val="6"/>
+                <c:pt idx="0">
+                  <c:v>3.0</c:v>
+                </c:pt>
+                <c:pt idx="1">
+                  <c:v>17.0</c:v>
+                </c:pt>
+                <c:pt idx="2">
+                  <c:v>63.0</c:v>
+                </c:pt>
+                <c:pt idx="3">
+                  <c:v>94.0</c:v>
+                </c:pt>
+                <c:pt idx="4">
+                  <c:v>110.0</c:v>
+                </c:pt>
+              </c:numCache>
+            </c:numRef>
+          </c:val>
+          <c:smooth val="0"/>
+        </c:ser>
+        <c:dLbls>
+          <c:showLegendKey val="0"/>
+          <c:showVal val="0"/>
+          <c:showCatName val="0"/>
+          <c:showSerName val="0"/>
+          <c:showPercent val="0"/>
+          <c:showBubbleSize val="0"/>
+        </c:dLbls>
+        <c:marker val="1"/>
+        <c:smooth val="0"/>
+        <c:axId val="2124692744"/>
+        <c:axId val="2109766392"/>
+      </c:lineChart>
+      <c:catAx>
+        <c:axId val="2124692744"/>
+        <c:scaling>
+          <c:orientation val="minMax"/>
+        </c:scaling>
+        <c:delete val="0"/>
+        <c:axPos val="b"/>
+        <c:majorTickMark val="out"/>
+        <c:minorTickMark val="none"/>
+        <c:tickLblPos val="nextTo"/>
+        <c:crossAx val="2109766392"/>
+        <c:crosses val="autoZero"/>
+        <c:auto val="1"/>
+        <c:lblAlgn val="ctr"/>
+        <c:lblOffset val="100"/>
+        <c:noMultiLvlLbl val="0"/>
+      </c:catAx>
+      <c:valAx>
+        <c:axId val="2109766392"/>
+        <c:scaling>
+          <c:orientation val="minMax"/>
+        </c:scaling>
+        <c:delete val="0"/>
+        <c:axPos val="l"/>
+        <c:majorGridlines/>
+        <c:title>
+          <c:tx>
+            <c:rich>
+              <a:bodyPr rot="-5400000" vert="horz"/>
+              <a:lstStyle/>
+              <a:p>
+                <a:pPr>
+                  <a:defRPr/>
+                </a:pPr>
+                <a:r>
+                  <a:rPr lang="en-US" dirty="0" smtClean="0"/>
+                  <a:t>Words checked</a:t>
+                </a:r>
+                <a:r>
+                  <a:rPr lang="en-US" baseline="0" dirty="0" smtClean="0"/>
+                  <a:t> per minute</a:t>
+                </a:r>
+                <a:endParaRPr lang="en-US" dirty="0"/>
+              </a:p>
+            </c:rich>
+          </c:tx>
+          <c:layout/>
+          <c:overlay val="0"/>
+        </c:title>
+        <c:numFmt formatCode="General" sourceLinked="1"/>
+        <c:majorTickMark val="out"/>
+        <c:minorTickMark val="none"/>
+        <c:tickLblPos val="nextTo"/>
+        <c:crossAx val="2124692744"/>
+        <c:crosses val="autoZero"/>
+        <c:crossBetween val="between"/>
+      </c:valAx>
+    </c:plotArea>
+    <c:legend>
+      <c:legendPos val="t"/>
+      <c:layout>
+        <c:manualLayout>
+          <c:xMode val="edge"/>
+          <c:yMode val="edge"/>
+          <c:x val="0.000652972003475051"/>
+          <c:y val="0.025"/>
+          <c:w val="0.972599888411339"/>
+          <c:h val="0.159986386652839"/>
+        </c:manualLayout>
+      </c:layout>
+      <c:overlay val="0"/>
+      <c:spPr>
+        <a:ln>
+          <a:noFill/>
+        </a:ln>
+      </c:spPr>
+    </c:legend>
+    <c:plotVisOnly val="1"/>
+    <c:dispBlanksAs val="gap"/>
+    <c:showDLblsOverMax val="0"/>
+  </c:chart>
+  <c:txPr>
+    <a:bodyPr/>
+    <a:lstStyle/>
+    <a:p>
+      <a:pPr>
+        <a:defRPr sz="1800"/>
+      </a:pPr>
+      <a:endParaRPr lang="en-US"/>
+    </a:p>
+  </c:txPr>
+  <c:externalData r:id="rId1">
+    <c:autoUpdate val="0"/>
+  </c:externalData>
+</c:chartSpace>
+</file>
+
+<file path=ppt/notesMasters/notesMaster1.xml><?xml version="1.0" encoding="utf-8"?>
+<p:notesMaster xmlns:a="http://schemas.openxmlformats.org/drawingml/2006/main" xmlns:r="http://schemas.openxmlformats.org/officeDocument/2006/relationships" xmlns:p="http://schemas.openxmlformats.org/presentationml/2006/main">
+  <p:cSld>
+    <p:bg>
+      <p:bgRef idx="1001">
+        <a:schemeClr val="bg1"/>
+      </p:bgRef>
+    </p:bg>
+    <p:spTree>
+      <p:nvGrpSpPr>
+        <p:cNvPr id="1" name=""/>
+        <p:cNvGrpSpPr/>
+        <p:nvPr/>
+      </p:nvGrpSpPr>
+      <p:grpSpPr>
+        <a:xfrm>
+          <a:off x="0" y="0"/>
+          <a:ext cx="0" cy="0"/>
+          <a:chOff x="0" y="0"/>
+          <a:chExt cx="0" cy="0"/>
+        </a:xfrm>
+      </p:grpSpPr>
+      <p:sp>
+        <p:nvSpPr>
+          <p:cNvPr id="2" name="Header Placeholder 1"/>
+          <p:cNvSpPr>
+            <a:spLocks noGrp="1"/>
+          </p:cNvSpPr>
+          <p:nvPr>
+            <p:ph type="hdr" sz="quarter"/>
+          </p:nvPr>
+        </p:nvSpPr>
+        <p:spPr>
+          <a:xfrm>
+            <a:off x="0" y="0"/>
+            <a:ext cx="2971800" cy="457200"/>
+          </a:xfrm>
+          <a:prstGeom prst="rect">
+            <a:avLst/>
+          </a:prstGeom>
+        </p:spPr>
+        <p:txBody>
+          <a:bodyPr vert="horz" lIns="91440" tIns="45720" rIns="91440" bIns="45720" rtlCol="0"/>
+          <a:lstStyle>
+            <a:lvl1pPr algn="l">
+              <a:defRPr sz="1200"/>
+            </a:lvl1pPr>
+          </a:lstStyle>
+          <a:p>
+            <a:endParaRPr lang="en-US"/>
+          </a:p>
+        </p:txBody>
+      </p:sp>
+      <p:sp>
+        <p:nvSpPr>
+          <p:cNvPr id="3" name="Date Placeholder 2"/>
+          <p:cNvSpPr>
+            <a:spLocks noGrp="1"/>
+          </p:cNvSpPr>
+          <p:nvPr>
+            <p:ph type="dt" idx="1"/>
+          </p:nvPr>
+        </p:nvSpPr>
+        <p:spPr>
+          <a:xfrm>
+            <a:off x="3884613" y="0"/>
+            <a:ext cx="2971800" cy="457200"/>
+          </a:xfrm>
+          <a:prstGeom prst="rect">
+            <a:avLst/>
+          </a:prstGeom>
+        </p:spPr>
+        <p:txBody>
+          <a:bodyPr vert="horz" lIns="91440" tIns="45720" rIns="91440" bIns="45720" rtlCol="0"/>
+          <a:lstStyle>
+            <a:lvl1pPr algn="r">
+              <a:defRPr sz="1200"/>
+            </a:lvl1pPr>
+          </a:lstStyle>
+          <a:p>
+            <a:fld id="{CAB753D3-14CE-224F-B386-7BEAFF09F768}" type="datetimeFigureOut">
+              <a:rPr lang="en-US" smtClean="0"/>
+              <a:t>12/5/15</a:t>
+            </a:fld>
+            <a:endParaRPr lang="en-US"/>
+          </a:p>
+        </p:txBody>
+      </p:sp>
+      <p:sp>
+        <p:nvSpPr>
+          <p:cNvPr id="4" name="Slide Image Placeholder 3"/>
+          <p:cNvSpPr>
+            <a:spLocks noGrp="1" noRot="1" noChangeAspect="1"/>
+          </p:cNvSpPr>
+          <p:nvPr>
+            <p:ph type="sldImg" idx="2"/>
+          </p:nvPr>
+        </p:nvSpPr>
+        <p:spPr>
+          <a:xfrm>
+            <a:off x="1143000" y="685800"/>
+            <a:ext cx="4572000" cy="3429000"/>
+          </a:xfrm>
+          <a:prstGeom prst="rect">
+            <a:avLst/>
+          </a:prstGeom>
+          <a:noFill/>
+          <a:ln w="12700">
+            <a:solidFill>
+              <a:prstClr val="black"/>
+            </a:solidFill>
+          </a:ln>
+        </p:spPr>
+        <p:txBody>
+          <a:bodyPr vert="horz" lIns="91440" tIns="45720" rIns="91440" bIns="45720" rtlCol="0" anchor="ctr"/>
+          <a:lstStyle/>
+          <a:p>
+            <a:endParaRPr lang="en-US"/>
+          </a:p>
+        </p:txBody>
+      </p:sp>
+      <p:sp>
+        <p:nvSpPr>
+          <p:cNvPr id="5" name="Notes Placeholder 4"/>
+          <p:cNvSpPr>
+            <a:spLocks noGrp="1"/>
+          </p:cNvSpPr>
+          <p:nvPr>
+            <p:ph type="body" sz="quarter" idx="3"/>
+          </p:nvPr>
+        </p:nvSpPr>
+        <p:spPr>
+          <a:xfrm>
+            <a:off x="685800" y="4343400"/>
+            <a:ext cx="5486400" cy="4114800"/>
+          </a:xfrm>
+          <a:prstGeom prst="rect">
+            <a:avLst/>
+          </a:prstGeom>
+        </p:spPr>
+        <p:txBody>
+          <a:bodyPr vert="horz" lIns="91440" tIns="45720" rIns="91440" bIns="45720" rtlCol="0"/>
+          <a:lstStyle/>
+          <a:p>
+            <a:pPr lvl="0"/>
+            <a:r>
+              <a:rPr lang="en-US" smtClean="0"/>
+              <a:t>Click to edit Master text styles</a:t>
+            </a:r>
+          </a:p>
+          <a:p>
+            <a:pPr lvl="1"/>
+            <a:r>
+              <a:rPr lang="en-US" smtClean="0"/>
+              <a:t>Second level</a:t>
+            </a:r>
+          </a:p>
+          <a:p>
+            <a:pPr lvl="2"/>
+            <a:r>
+              <a:rPr lang="en-US" smtClean="0"/>
+              <a:t>Third level</a:t>
+            </a:r>
+          </a:p>
+          <a:p>
+            <a:pPr lvl="3"/>
+            <a:r>
+              <a:rPr lang="en-US" smtClean="0"/>
+              <a:t>Fourth level</a:t>
+            </a:r>
+          </a:p>
+          <a:p>
+            <a:pPr lvl="4"/>
+            <a:r>
+              <a:rPr lang="en-US" smtClean="0"/>
+              <a:t>Fifth level</a:t>
+            </a:r>
+            <a:endParaRPr lang="en-US"/>
+          </a:p>
+        </p:txBody>
+      </p:sp>
+      <p:sp>
+        <p:nvSpPr>
+          <p:cNvPr id="6" name="Footer Placeholder 5"/>
+          <p:cNvSpPr>
+            <a:spLocks noGrp="1"/>
+          </p:cNvSpPr>
+          <p:nvPr>
+            <p:ph type="ftr" sz="quarter" idx="4"/>
+          </p:nvPr>
+        </p:nvSpPr>
+        <p:spPr>
+          <a:xfrm>
+            <a:off x="0" y="8685213"/>
+            <a:ext cx="2971800" cy="457200"/>
+          </a:xfrm>
+          <a:prstGeom prst="rect">
+            <a:avLst/>
+          </a:prstGeom>
+        </p:spPr>
+        <p:txBody>
+          <a:bodyPr vert="horz" lIns="91440" tIns="45720" rIns="91440" bIns="45720" rtlCol="0" anchor="b"/>
+          <a:lstStyle>
+            <a:lvl1pPr algn="l">
+              <a:defRPr sz="1200"/>
+            </a:lvl1pPr>
+          </a:lstStyle>
+          <a:p>
+            <a:endParaRPr lang="en-US"/>
+          </a:p>
+        </p:txBody>
+      </p:sp>
+      <p:sp>
+        <p:nvSpPr>
+          <p:cNvPr id="7" name="Slide Number Placeholder 6"/>
+          <p:cNvSpPr>
+            <a:spLocks noGrp="1"/>
+          </p:cNvSpPr>
+          <p:nvPr>
+            <p:ph type="sldNum" sz="quarter" idx="5"/>
+          </p:nvPr>
+        </p:nvSpPr>
+        <p:spPr>
+          <a:xfrm>
+            <a:off x="3884613" y="8685213"/>
+            <a:ext cx="2971800" cy="457200"/>
+          </a:xfrm>
+          <a:prstGeom prst="rect">
+            <a:avLst/>
+          </a:prstGeom>
+        </p:spPr>
+        <p:txBody>
+          <a:bodyPr vert="horz" lIns="91440" tIns="45720" rIns="91440" bIns="45720" rtlCol="0" anchor="b"/>
+          <a:lstStyle>
+            <a:lvl1pPr algn="r">
+              <a:defRPr sz="1200"/>
+            </a:lvl1pPr>
+          </a:lstStyle>
+          <a:p>
+            <a:fld id="{AA910E80-1A00-3546-A6C0-453964075F15}" type="slidenum">
+              <a:rPr lang="en-US" smtClean="0"/>
+              <a:t>‹#›</a:t>
+            </a:fld>
+            <a:endParaRPr lang="en-US"/>
+          </a:p>
+        </p:txBody>
+      </p:sp>
+    </p:spTree>
+    <p:extLst>
+      <p:ext uri="{BB962C8B-B14F-4D97-AF65-F5344CB8AC3E}">
+        <p14:creationId xmlns:p14="http://schemas.microsoft.com/office/powerpoint/2010/main" val="1205787891"/>
+      </p:ext>
+    </p:extLst>
+  </p:cSld>
+  <p:clrMap bg1="lt1" tx1="dk1" bg2="lt2" tx2="dk2" accent1="accent1" accent2="accent2" accent3="accent3" accent4="accent4" accent5="accent5" accent6="accent6" hlink="hlink" folHlink="folHlink"/>
+  <p:notesStyle>
+    <a:lvl1pPr marL="0" algn="l" defTabSz="457200" rtl="0" eaLnBrk="1" latinLnBrk="0" hangingPunct="1">
+      <a:defRPr sz="1200" kern="1200">
+        <a:solidFill>
+          <a:schemeClr val="tx1"/>
+        </a:solidFill>
+        <a:latin typeface="+mn-lt"/>
+        <a:ea typeface="+mn-ea"/>
+        <a:cs typeface="+mn-cs"/>
+      </a:defRPr>
+    </a:lvl1pPr>
+    <a:lvl2pPr marL="457200" algn="l" defTabSz="457200" rtl="0" eaLnBrk="1" latinLnBrk="0" hangingPunct="1">
+      <a:defRPr sz="1200" kern="1200">
+        <a:solidFill>
+          <a:schemeClr val="tx1"/>
+        </a:solidFill>
+        <a:latin typeface="+mn-lt"/>
+        <a:ea typeface="+mn-ea"/>
+        <a:cs typeface="+mn-cs"/>
+      </a:defRPr>
+    </a:lvl2pPr>
+    <a:lvl3pPr marL="914400" algn="l" defTabSz="457200" rtl="0" eaLnBrk="1" latinLnBrk="0" hangingPunct="1">
+      <a:defRPr sz="1200" kern="1200">
+        <a:solidFill>
+          <a:schemeClr val="tx1"/>
+        </a:solidFill>
+        <a:latin typeface="+mn-lt"/>
+        <a:ea typeface="+mn-ea"/>
+        <a:cs typeface="+mn-cs"/>
+      </a:defRPr>
+    </a:lvl3pPr>
+    <a:lvl4pPr marL="1371600" algn="l" defTabSz="457200" rtl="0" eaLnBrk="1" latinLnBrk="0" hangingPunct="1">
+      <a:defRPr sz="1200" kern="1200">
+        <a:solidFill>
+          <a:schemeClr val="tx1"/>
+        </a:solidFill>
+        <a:latin typeface="+mn-lt"/>
+        <a:ea typeface="+mn-ea"/>
+        <a:cs typeface="+mn-cs"/>
+      </a:defRPr>
+    </a:lvl4pPr>
+    <a:lvl5pPr marL="1828800" algn="l" defTabSz="457200" rtl="0" eaLnBrk="1" latinLnBrk="0" hangingPunct="1">
+      <a:defRPr sz="1200" kern="1200">
+        <a:solidFill>
+          <a:schemeClr val="tx1"/>
+        </a:solidFill>
+        <a:latin typeface="+mn-lt"/>
+        <a:ea typeface="+mn-ea"/>
+        <a:cs typeface="+mn-cs"/>
+      </a:defRPr>
+    </a:lvl5pPr>
+    <a:lvl6pPr marL="2286000" algn="l" defTabSz="457200" rtl="0" eaLnBrk="1" latinLnBrk="0" hangingPunct="1">
+      <a:defRPr sz="1200" kern="1200">
+        <a:solidFill>
+          <a:schemeClr val="tx1"/>
+        </a:solidFill>
+        <a:latin typeface="+mn-lt"/>
+        <a:ea typeface="+mn-ea"/>
+        <a:cs typeface="+mn-cs"/>
+      </a:defRPr>
+    </a:lvl6pPr>
+    <a:lvl7pPr marL="2743200" algn="l" defTabSz="457200" rtl="0" eaLnBrk="1" latinLnBrk="0" hangingPunct="1">
+      <a:defRPr sz="1200" kern="1200">
+        <a:solidFill>
+          <a:schemeClr val="tx1"/>
+        </a:solidFill>
+        <a:latin typeface="+mn-lt"/>
+        <a:ea typeface="+mn-ea"/>
+        <a:cs typeface="+mn-cs"/>
+      </a:defRPr>
+    </a:lvl7pPr>
+    <a:lvl8pPr marL="3200400" algn="l" defTabSz="457200" rtl="0" eaLnBrk="1" latinLnBrk="0" hangingPunct="1">
+      <a:defRPr sz="1200" kern="1200">
+        <a:solidFill>
+          <a:schemeClr val="tx1"/>
+        </a:solidFill>
+        <a:latin typeface="+mn-lt"/>
+        <a:ea typeface="+mn-ea"/>
+        <a:cs typeface="+mn-cs"/>
+      </a:defRPr>
+    </a:lvl8pPr>
+    <a:lvl9pPr marL="3657600" algn="l" defTabSz="457200" rtl="0" eaLnBrk="1" latinLnBrk="0" hangingPunct="1">
+      <a:defRPr sz="1200" kern="1200">
+        <a:solidFill>
+          <a:schemeClr val="tx1"/>
+        </a:solidFill>
+        <a:latin typeface="+mn-lt"/>
+        <a:ea typeface="+mn-ea"/>
+        <a:cs typeface="+mn-cs"/>
+      </a:defRPr>
+    </a:lvl9pPr>
+  </p:notesStyle>
+</p:notesMaster>
+</file>
+
+<file path=ppt/notesSlides/notesSlide1.xml><?xml version="1.0" encoding="utf-8"?>
+<p:notes xmlns:a="http://schemas.openxmlformats.org/drawingml/2006/main" xmlns:r="http://schemas.openxmlformats.org/officeDocument/2006/relationships" xmlns:p="http://schemas.openxmlformats.org/presentationml/2006/main">
+  <p:cSld>
+    <p:spTree>
+      <p:nvGrpSpPr>
+        <p:cNvPr id="1" name=""/>
+        <p:cNvGrpSpPr/>
+        <p:nvPr/>
+      </p:nvGrpSpPr>
+      <p:grpSpPr>
+        <a:xfrm>
+          <a:off x="0" y="0"/>
+          <a:ext cx="0" cy="0"/>
+          <a:chOff x="0" y="0"/>
+          <a:chExt cx="0" cy="0"/>
+        </a:xfrm>
+      </p:grpSpPr>
+      <p:sp>
+        <p:nvSpPr>
+          <p:cNvPr id="2" name="Slide Image Placeholder 1"/>
+          <p:cNvSpPr>
+            <a:spLocks noGrp="1" noRot="1" noChangeAspect="1"/>
+          </p:cNvSpPr>
+          <p:nvPr>
+            <p:ph type="sldImg"/>
+          </p:nvPr>
+        </p:nvSpPr>
+        <p:spPr/>
+      </p:sp>
+      <p:sp>
+        <p:nvSpPr>
+          <p:cNvPr id="3" name="Notes Placeholder 2"/>
+          <p:cNvSpPr>
+            <a:spLocks noGrp="1"/>
+          </p:cNvSpPr>
+          <p:nvPr>
+            <p:ph type="body" idx="1"/>
+          </p:nvPr>
+        </p:nvSpPr>
+        <p:spPr/>
+        <p:txBody>
+          <a:bodyPr/>
+          <a:lstStyle/>
+          <a:p>
+            <a:endParaRPr lang="en-US" dirty="0"/>
+          </a:p>
+        </p:txBody>
+      </p:sp>
+      <p:sp>
+        <p:nvSpPr>
+          <p:cNvPr id="4" name="Slide Number Placeholder 3"/>
+          <p:cNvSpPr>
+            <a:spLocks noGrp="1"/>
+          </p:cNvSpPr>
+          <p:nvPr>
+            <p:ph type="sldNum" sz="quarter" idx="10"/>
+          </p:nvPr>
+        </p:nvSpPr>
+        <p:spPr/>
+        <p:txBody>
+          <a:bodyPr/>
+          <a:lstStyle/>
+          <a:p>
+            <a:fld id="{AA910E80-1A00-3546-A6C0-453964075F15}" type="slidenum">
+              <a:rPr lang="en-US" smtClean="0"/>
+              <a:t>58</a:t>
+            </a:fld>
+            <a:endParaRPr lang="en-US"/>
+          </a:p>
+        </p:txBody>
+      </p:sp>
+    </p:spTree>
+    <p:extLst>
+      <p:ext uri="{BB962C8B-B14F-4D97-AF65-F5344CB8AC3E}">
+        <p14:creationId xmlns:p14="http://schemas.microsoft.com/office/powerpoint/2010/main" val="2903607009"/>
+      </p:ext>
+    </p:extLst>
+  </p:cSld>
+  <p:clrMapOvr>
+    <a:masterClrMapping/>
+  </p:clrMapOvr>
+</p:notes>
 </file>
 
 <file path=ppt/slideLayouts/slideLayout1.xml><?xml version="1.0" encoding="utf-8"?>
@@ -42173,6 +43125,170 @@
 </p:sld>
 </file>
 
+<file path=ppt/slides/slide58.xml><?xml version="1.0" encoding="utf-8"?>
+<p:sld xmlns:a="http://schemas.openxmlformats.org/drawingml/2006/main" xmlns:r="http://schemas.openxmlformats.org/officeDocument/2006/relationships" xmlns:p="http://schemas.openxmlformats.org/presentationml/2006/main">
+  <p:cSld>
+    <p:spTree>
+      <p:nvGrpSpPr>
+        <p:cNvPr id="1" name=""/>
+        <p:cNvGrpSpPr/>
+        <p:nvPr/>
+      </p:nvGrpSpPr>
+      <p:grpSpPr>
+        <a:xfrm>
+          <a:off x="0" y="0"/>
+          <a:ext cx="0" cy="0"/>
+          <a:chOff x="0" y="0"/>
+          <a:chExt cx="0" cy="0"/>
+        </a:xfrm>
+      </p:grpSpPr>
+      <p:sp>
+        <p:nvSpPr>
+          <p:cNvPr id="4" name="TextBox 3"/>
+          <p:cNvSpPr txBox="1"/>
+          <p:nvPr/>
+        </p:nvSpPr>
+        <p:spPr>
+          <a:xfrm>
+            <a:off x="0" y="336259"/>
+            <a:ext cx="9144000" cy="646331"/>
+          </a:xfrm>
+          <a:prstGeom prst="rect">
+            <a:avLst/>
+          </a:prstGeom>
+          <a:noFill/>
+        </p:spPr>
+        <p:txBody>
+          <a:bodyPr wrap="square" rtlCol="0">
+            <a:spAutoFit/>
+          </a:bodyPr>
+          <a:lstStyle/>
+          <a:p>
+            <a:pPr algn="ctr"/>
+            <a:r>
+              <a:rPr lang="en-US" sz="3600" b="1" dirty="0" smtClean="0">
+                <a:latin typeface="American Typewriter"/>
+                <a:cs typeface="American Typewriter"/>
+              </a:rPr>
+              <a:t>SERIAL VS PARALLEL RUNTIMES</a:t>
+            </a:r>
+            <a:endParaRPr lang="en-US" sz="3600" b="1" dirty="0" smtClean="0">
+              <a:latin typeface="American Typewriter"/>
+              <a:cs typeface="American Typewriter"/>
+            </a:endParaRPr>
+          </a:p>
+        </p:txBody>
+      </p:sp>
+      <p:graphicFrame>
+        <p:nvGraphicFramePr>
+          <p:cNvPr id="2" name="Chart 1"/>
+          <p:cNvGraphicFramePr/>
+          <p:nvPr>
+            <p:extLst>
+              <p:ext uri="{D42A27DB-BD31-4B8C-83A1-F6EECF244321}">
+                <p14:modId xmlns:p14="http://schemas.microsoft.com/office/powerpoint/2010/main" val="4112442802"/>
+              </p:ext>
+            </p:extLst>
+          </p:nvPr>
+        </p:nvGraphicFramePr>
+        <p:xfrm>
+          <a:off x="621543" y="1437529"/>
+          <a:ext cx="7850260" cy="4736528"/>
+        </p:xfrm>
+        <a:graphic>
+          <a:graphicData uri="http://schemas.openxmlformats.org/drawingml/2006/chart">
+            <c:chart xmlns:c="http://schemas.openxmlformats.org/drawingml/2006/chart" xmlns:r="http://schemas.openxmlformats.org/officeDocument/2006/relationships" r:id="rId3"/>
+          </a:graphicData>
+        </a:graphic>
+      </p:graphicFrame>
+      <p:sp>
+        <p:nvSpPr>
+          <p:cNvPr id="5" name="TextBox 4"/>
+          <p:cNvSpPr txBox="1"/>
+          <p:nvPr/>
+        </p:nvSpPr>
+        <p:spPr>
+          <a:xfrm>
+            <a:off x="638812" y="5489343"/>
+            <a:ext cx="1406004" cy="646331"/>
+          </a:xfrm>
+          <a:prstGeom prst="rect">
+            <a:avLst/>
+          </a:prstGeom>
+          <a:noFill/>
+        </p:spPr>
+        <p:txBody>
+          <a:bodyPr wrap="none" rtlCol="0">
+            <a:spAutoFit/>
+          </a:bodyPr>
+          <a:lstStyle/>
+          <a:p>
+            <a:pPr algn="ctr"/>
+            <a:r>
+              <a:rPr lang="en-US" dirty="0" smtClean="0"/>
+              <a:t>Yelp reviews</a:t>
+            </a:r>
+          </a:p>
+          <a:p>
+            <a:pPr algn="ctr"/>
+            <a:r>
+              <a:rPr lang="en-US" dirty="0" smtClean="0"/>
+              <a:t>Words</a:t>
+            </a:r>
+            <a:endParaRPr lang="en-US" dirty="0"/>
+          </a:p>
+        </p:txBody>
+      </p:sp>
+      <p:sp>
+        <p:nvSpPr>
+          <p:cNvPr id="7" name="TextBox 6"/>
+          <p:cNvSpPr txBox="1"/>
+          <p:nvPr/>
+        </p:nvSpPr>
+        <p:spPr>
+          <a:xfrm>
+            <a:off x="0" y="6488668"/>
+            <a:ext cx="5098571" cy="338554"/>
+          </a:xfrm>
+          <a:prstGeom prst="rect">
+            <a:avLst/>
+          </a:prstGeom>
+          <a:noFill/>
+        </p:spPr>
+        <p:txBody>
+          <a:bodyPr wrap="none" rtlCol="0">
+            <a:spAutoFit/>
+          </a:bodyPr>
+          <a:lstStyle/>
+          <a:p>
+            <a:r>
+              <a:rPr lang="en-US" sz="1600" dirty="0" smtClean="0"/>
+              <a:t>AWS runtimes based on: 4 executors, 4 cores, 16 partitions</a:t>
+            </a:r>
+            <a:endParaRPr lang="en-US" sz="1600" dirty="0"/>
+          </a:p>
+        </p:txBody>
+      </p:sp>
+    </p:spTree>
+    <p:extLst>
+      <p:ext uri="{BB962C8B-B14F-4D97-AF65-F5344CB8AC3E}">
+        <p14:creationId xmlns:p14="http://schemas.microsoft.com/office/powerpoint/2010/main" val="2048688854"/>
+      </p:ext>
+    </p:extLst>
+  </p:cSld>
+  <p:clrMapOvr>
+    <a:masterClrMapping/>
+  </p:clrMapOvr>
+  <p:timing>
+    <p:tnLst>
+      <p:par>
+        <p:cTn xmlns:p14="http://schemas.microsoft.com/office/powerpoint/2010/main" id="1" dur="indefinite" restart="never" nodeType="tmRoot"/>
+      </p:par>
+    </p:tnLst>
+  </p:timing>
+</p:sld>
+</file>
+
 <file path=ppt/slides/slide6.xml><?xml version="1.0" encoding="utf-8"?>
 <p:sld xmlns:a="http://schemas.openxmlformats.org/drawingml/2006/main" xmlns:r="http://schemas.openxmlformats.org/officeDocument/2006/relationships" xmlns:p="http://schemas.openxmlformats.org/presentationml/2006/main">
   <p:cSld>
@@ -44298,4 +45414,324 @@
   </a:objectDefaults>
   <a:extraClrSchemeLst/>
 </a:theme>
+</file>
+
+<file path=ppt/theme/theme2.xml><?xml version="1.0" encoding="utf-8"?>
+<a:theme xmlns:a="http://schemas.openxmlformats.org/drawingml/2006/main" name="Office Theme">
+  <a:themeElements>
+    <a:clrScheme name="Office">
+      <a:dk1>
+        <a:sysClr val="windowText" lastClr="000000"/>
+      </a:dk1>
+      <a:lt1>
+        <a:sysClr val="window" lastClr="FFFFFF"/>
+      </a:lt1>
+      <a:dk2>
+        <a:srgbClr val="1F497D"/>
+      </a:dk2>
+      <a:lt2>
+        <a:srgbClr val="EEECE1"/>
+      </a:lt2>
+      <a:accent1>
+        <a:srgbClr val="4F81BD"/>
+      </a:accent1>
+      <a:accent2>
+        <a:srgbClr val="C0504D"/>
+      </a:accent2>
+      <a:accent3>
+        <a:srgbClr val="9BBB59"/>
+      </a:accent3>
+      <a:accent4>
+        <a:srgbClr val="8064A2"/>
+      </a:accent4>
+      <a:accent5>
+        <a:srgbClr val="4BACC6"/>
+      </a:accent5>
+      <a:accent6>
+        <a:srgbClr val="F79646"/>
+      </a:accent6>
+      <a:hlink>
+        <a:srgbClr val="0000FF"/>
+      </a:hlink>
+      <a:folHlink>
+        <a:srgbClr val="800080"/>
+      </a:folHlink>
+    </a:clrScheme>
+    <a:fontScheme name="Office">
+      <a:majorFont>
+        <a:latin typeface="Calibri"/>
+        <a:ea typeface=""/>
+        <a:cs typeface=""/>
+        <a:font script="Jpan" typeface="ＭＳ Ｐゴシック"/>
+        <a:font script="Hang" typeface="맑은 고딕"/>
+        <a:font script="Hans" typeface="宋体"/>
+        <a:font script="Hant" typeface="新細明體"/>
+        <a:font script="Arab" typeface="Times New Roman"/>
+        <a:font script="Hebr" typeface="Times New Roman"/>
+        <a:font script="Thai" typeface="Angsana New"/>
+        <a:font script="Ethi" typeface="Nyala"/>
+        <a:font script="Beng" typeface="Vrinda"/>
+        <a:font script="Gujr" typeface="Shruti"/>
+        <a:font script="Khmr" typeface="MoolBoran"/>
+        <a:font script="Knda" typeface="Tunga"/>
+        <a:font script="Guru" typeface="Raavi"/>
+        <a:font script="Cans" typeface="Euphemia"/>
+        <a:font script="Cher" typeface="Plantagenet Cherokee"/>
+        <a:font script="Yiii" typeface="Microsoft Yi Baiti"/>
+        <a:font script="Tibt" typeface="Microsoft Himalaya"/>
+        <a:font script="Thaa" typeface="MV Boli"/>
+        <a:font script="Deva" typeface="Mangal"/>
+        <a:font script="Telu" typeface="Gautami"/>
+        <a:font script="Taml" typeface="Latha"/>
+        <a:font script="Syrc" typeface="Estrangelo Edessa"/>
+        <a:font script="Orya" typeface="Kalinga"/>
+        <a:font script="Mlym" typeface="Kartika"/>
+        <a:font script="Laoo" typeface="DokChampa"/>
+        <a:font script="Sinh" typeface="Iskoola Pota"/>
+        <a:font script="Mong" typeface="Mongolian Baiti"/>
+        <a:font script="Viet" typeface="Times New Roman"/>
+        <a:font script="Uigh" typeface="Microsoft Uighur"/>
+        <a:font script="Geor" typeface="Sylfaen"/>
+      </a:majorFont>
+      <a:minorFont>
+        <a:latin typeface="Calibri"/>
+        <a:ea typeface=""/>
+        <a:cs typeface=""/>
+        <a:font script="Jpan" typeface="ＭＳ Ｐゴシック"/>
+        <a:font script="Hang" typeface="맑은 고딕"/>
+        <a:font script="Hans" typeface="宋体"/>
+        <a:font script="Hant" typeface="新細明體"/>
+        <a:font script="Arab" typeface="Arial"/>
+        <a:font script="Hebr" typeface="Arial"/>
+        <a:font script="Thai" typeface="Cordia New"/>
+        <a:font script="Ethi" typeface="Nyala"/>
+        <a:font script="Beng" typeface="Vrinda"/>
+        <a:font script="Gujr" typeface="Shruti"/>
+        <a:font script="Khmr" typeface="DaunPenh"/>
+        <a:font script="Knda" typeface="Tunga"/>
+        <a:font script="Guru" typeface="Raavi"/>
+        <a:font script="Cans" typeface="Euphemia"/>
+        <a:font script="Cher" typeface="Plantagenet Cherokee"/>
+        <a:font script="Yiii" typeface="Microsoft Yi Baiti"/>
+        <a:font script="Tibt" typeface="Microsoft Himalaya"/>
+        <a:font script="Thaa" typeface="MV Boli"/>
+        <a:font script="Deva" typeface="Mangal"/>
+        <a:font script="Telu" typeface="Gautami"/>
+        <a:font script="Taml" typeface="Latha"/>
+        <a:font script="Syrc" typeface="Estrangelo Edessa"/>
+        <a:font script="Orya" typeface="Kalinga"/>
+        <a:font script="Mlym" typeface="Kartika"/>
+        <a:font script="Laoo" typeface="DokChampa"/>
+        <a:font script="Sinh" typeface="Iskoola Pota"/>
+        <a:font script="Mong" typeface="Mongolian Baiti"/>
+        <a:font script="Viet" typeface="Arial"/>
+        <a:font script="Uigh" typeface="Microsoft Uighur"/>
+        <a:font script="Geor" typeface="Sylfaen"/>
+      </a:minorFont>
+    </a:fontScheme>
+    <a:fmtScheme name="Office">
+      <a:fillStyleLst>
+        <a:solidFill>
+          <a:schemeClr val="phClr"/>
+        </a:solidFill>
+        <a:gradFill rotWithShape="1">
+          <a:gsLst>
+            <a:gs pos="0">
+              <a:schemeClr val="phClr">
+                <a:tint val="50000"/>
+                <a:satMod val="300000"/>
+              </a:schemeClr>
+            </a:gs>
+            <a:gs pos="35000">
+              <a:schemeClr val="phClr">
+                <a:tint val="37000"/>
+                <a:satMod val="300000"/>
+              </a:schemeClr>
+            </a:gs>
+            <a:gs pos="100000">
+              <a:schemeClr val="phClr">
+                <a:tint val="15000"/>
+                <a:satMod val="350000"/>
+              </a:schemeClr>
+            </a:gs>
+          </a:gsLst>
+          <a:lin ang="16200000" scaled="1"/>
+        </a:gradFill>
+        <a:gradFill rotWithShape="1">
+          <a:gsLst>
+            <a:gs pos="0">
+              <a:schemeClr val="phClr">
+                <a:tint val="100000"/>
+                <a:shade val="100000"/>
+                <a:satMod val="130000"/>
+              </a:schemeClr>
+            </a:gs>
+            <a:gs pos="100000">
+              <a:schemeClr val="phClr">
+                <a:tint val="50000"/>
+                <a:shade val="100000"/>
+                <a:satMod val="350000"/>
+              </a:schemeClr>
+            </a:gs>
+          </a:gsLst>
+          <a:lin ang="16200000" scaled="0"/>
+        </a:gradFill>
+      </a:fillStyleLst>
+      <a:lnStyleLst>
+        <a:ln w="9525" cap="flat" cmpd="sng" algn="ctr">
+          <a:solidFill>
+            <a:schemeClr val="phClr">
+              <a:shade val="95000"/>
+              <a:satMod val="105000"/>
+            </a:schemeClr>
+          </a:solidFill>
+          <a:prstDash val="solid"/>
+        </a:ln>
+        <a:ln w="25400" cap="flat" cmpd="sng" algn="ctr">
+          <a:solidFill>
+            <a:schemeClr val="phClr"/>
+          </a:solidFill>
+          <a:prstDash val="solid"/>
+        </a:ln>
+        <a:ln w="38100" cap="flat" cmpd="sng" algn="ctr">
+          <a:solidFill>
+            <a:schemeClr val="phClr"/>
+          </a:solidFill>
+          <a:prstDash val="solid"/>
+        </a:ln>
+      </a:lnStyleLst>
+      <a:effectStyleLst>
+        <a:effectStyle>
+          <a:effectLst>
+            <a:outerShdw blurRad="40000" dist="20000" dir="5400000" rotWithShape="0">
+              <a:srgbClr val="000000">
+                <a:alpha val="38000"/>
+              </a:srgbClr>
+            </a:outerShdw>
+          </a:effectLst>
+        </a:effectStyle>
+        <a:effectStyle>
+          <a:effectLst>
+            <a:outerShdw blurRad="40000" dist="23000" dir="5400000" rotWithShape="0">
+              <a:srgbClr val="000000">
+                <a:alpha val="35000"/>
+              </a:srgbClr>
+            </a:outerShdw>
+          </a:effectLst>
+        </a:effectStyle>
+        <a:effectStyle>
+          <a:effectLst>
+            <a:outerShdw blurRad="40000" dist="23000" dir="5400000" rotWithShape="0">
+              <a:srgbClr val="000000">
+                <a:alpha val="35000"/>
+              </a:srgbClr>
+            </a:outerShdw>
+          </a:effectLst>
+          <a:scene3d>
+            <a:camera prst="orthographicFront">
+              <a:rot lat="0" lon="0" rev="0"/>
+            </a:camera>
+            <a:lightRig rig="threePt" dir="t">
+              <a:rot lat="0" lon="0" rev="1200000"/>
+            </a:lightRig>
+          </a:scene3d>
+          <a:sp3d>
+            <a:bevelT w="63500" h="25400"/>
+          </a:sp3d>
+        </a:effectStyle>
+      </a:effectStyleLst>
+      <a:bgFillStyleLst>
+        <a:solidFill>
+          <a:schemeClr val="phClr"/>
+        </a:solidFill>
+        <a:gradFill rotWithShape="1">
+          <a:gsLst>
+            <a:gs pos="0">
+              <a:schemeClr val="phClr">
+                <a:tint val="40000"/>
+                <a:satMod val="350000"/>
+              </a:schemeClr>
+            </a:gs>
+            <a:gs pos="40000">
+              <a:schemeClr val="phClr">
+                <a:tint val="45000"/>
+                <a:shade val="99000"/>
+                <a:satMod val="350000"/>
+              </a:schemeClr>
+            </a:gs>
+            <a:gs pos="100000">
+              <a:schemeClr val="phClr">
+                <a:shade val="20000"/>
+                <a:satMod val="255000"/>
+              </a:schemeClr>
+            </a:gs>
+          </a:gsLst>
+          <a:path path="circle">
+            <a:fillToRect l="50000" t="-80000" r="50000" b="180000"/>
+          </a:path>
+        </a:gradFill>
+        <a:gradFill rotWithShape="1">
+          <a:gsLst>
+            <a:gs pos="0">
+              <a:schemeClr val="phClr">
+                <a:tint val="80000"/>
+                <a:satMod val="300000"/>
+              </a:schemeClr>
+            </a:gs>
+            <a:gs pos="100000">
+              <a:schemeClr val="phClr">
+                <a:shade val="30000"/>
+                <a:satMod val="200000"/>
+              </a:schemeClr>
+            </a:gs>
+          </a:gsLst>
+          <a:path path="circle">
+            <a:fillToRect l="50000" t="50000" r="50000" b="50000"/>
+          </a:path>
+        </a:gradFill>
+      </a:bgFillStyleLst>
+    </a:fmtScheme>
+  </a:themeElements>
+  <a:objectDefaults>
+    <a:spDef>
+      <a:spPr/>
+      <a:bodyPr/>
+      <a:lstStyle/>
+      <a:style>
+        <a:lnRef idx="1">
+          <a:schemeClr val="accent1"/>
+        </a:lnRef>
+        <a:fillRef idx="3">
+          <a:schemeClr val="accent1"/>
+        </a:fillRef>
+        <a:effectRef idx="2">
+          <a:schemeClr val="accent1"/>
+        </a:effectRef>
+        <a:fontRef idx="minor">
+          <a:schemeClr val="lt1"/>
+        </a:fontRef>
+      </a:style>
+    </a:spDef>
+    <a:lnDef>
+      <a:spPr/>
+      <a:bodyPr/>
+      <a:lstStyle/>
+      <a:style>
+        <a:lnRef idx="2">
+          <a:schemeClr val="accent1"/>
+        </a:lnRef>
+        <a:fillRef idx="0">
+          <a:schemeClr val="accent1"/>
+        </a:fillRef>
+        <a:effectRef idx="1">
+          <a:schemeClr val="accent1"/>
+        </a:effectRef>
+        <a:fontRef idx="minor">
+          <a:schemeClr val="tx1"/>
+        </a:fontRef>
+      </a:style>
+    </a:lnDef>
+  </a:objectDefaults>
+  <a:extraClrSchemeLst/>
+</a:theme>
 </file>
</xml_diff>